<commit_message>
test install target instructions
test install base code (iotivity, iotivity-node, iot-rest-api, on
Digital Ocean droplet, test end to end
</commit_message>
<xml_diff>
--- a/docs/st-servient.pptx
+++ b/docs/st-servient.pptx
@@ -5,7 +5,7 @@
     <p:sldMasterId id="2147483648" r:id="rId1"/>
   </p:sldMasterIdLst>
   <p:notesMasterIdLst>
-    <p:notesMasterId r:id="rId9"/>
+    <p:notesMasterId r:id="rId11"/>
   </p:notesMasterIdLst>
   <p:sldIdLst>
     <p:sldId id="256" r:id="rId2"/>
@@ -13,8 +13,10 @@
     <p:sldId id="257" r:id="rId4"/>
     <p:sldId id="259" r:id="rId5"/>
     <p:sldId id="260" r:id="rId6"/>
-    <p:sldId id="261" r:id="rId7"/>
-    <p:sldId id="262" r:id="rId8"/>
+    <p:sldId id="262" r:id="rId7"/>
+    <p:sldId id="261" r:id="rId8"/>
+    <p:sldId id="263" r:id="rId9"/>
+    <p:sldId id="264" r:id="rId10"/>
   </p:sldIdLst>
   <p:sldSz cx="9144000" cy="6858000" type="screen4x3"/>
   <p:notesSz cx="6858000" cy="9144000"/>
@@ -197,7 +199,7 @@
           </a:lstStyle>
           <a:p>
             <a:fld id="{030DE282-5A1D-FF4D-B30E-6D83B35D53CE}" type="datetimeFigureOut">
-              <a:t>5/26/16</a:t>
+              <a:t>5/29/16</a:t>
             </a:fld>
             <a:endParaRPr lang="en-US"/>
           </a:p>
@@ -724,7 +726,7 @@
           <a:lstStyle/>
           <a:p>
             <a:fld id="{45A1D096-1234-0C43-97F4-0FFC37CF404A}" type="datetimeFigureOut">
-              <a:t>5/26/16</a:t>
+              <a:t>5/29/16</a:t>
             </a:fld>
             <a:endParaRPr lang="en-US"/>
           </a:p>
@@ -890,7 +892,7 @@
           <a:lstStyle/>
           <a:p>
             <a:fld id="{45A1D096-1234-0C43-97F4-0FFC37CF404A}" type="datetimeFigureOut">
-              <a:t>5/26/16</a:t>
+              <a:t>5/29/16</a:t>
             </a:fld>
             <a:endParaRPr lang="en-US"/>
           </a:p>
@@ -1066,7 +1068,7 @@
           <a:lstStyle/>
           <a:p>
             <a:fld id="{45A1D096-1234-0C43-97F4-0FFC37CF404A}" type="datetimeFigureOut">
-              <a:t>5/26/16</a:t>
+              <a:t>5/29/16</a:t>
             </a:fld>
             <a:endParaRPr lang="en-US"/>
           </a:p>
@@ -1232,7 +1234,7 @@
           <a:lstStyle/>
           <a:p>
             <a:fld id="{45A1D096-1234-0C43-97F4-0FFC37CF404A}" type="datetimeFigureOut">
-              <a:t>5/26/16</a:t>
+              <a:t>5/29/16</a:t>
             </a:fld>
             <a:endParaRPr lang="en-US"/>
           </a:p>
@@ -1475,7 +1477,7 @@
           <a:lstStyle/>
           <a:p>
             <a:fld id="{45A1D096-1234-0C43-97F4-0FFC37CF404A}" type="datetimeFigureOut">
-              <a:t>5/26/16</a:t>
+              <a:t>5/29/16</a:t>
             </a:fld>
             <a:endParaRPr lang="en-US"/>
           </a:p>
@@ -1758,7 +1760,7 @@
           <a:lstStyle/>
           <a:p>
             <a:fld id="{45A1D096-1234-0C43-97F4-0FFC37CF404A}" type="datetimeFigureOut">
-              <a:t>5/26/16</a:t>
+              <a:t>5/29/16</a:t>
             </a:fld>
             <a:endParaRPr lang="en-US"/>
           </a:p>
@@ -2175,7 +2177,7 @@
           <a:lstStyle/>
           <a:p>
             <a:fld id="{45A1D096-1234-0C43-97F4-0FFC37CF404A}" type="datetimeFigureOut">
-              <a:t>5/26/16</a:t>
+              <a:t>5/29/16</a:t>
             </a:fld>
             <a:endParaRPr lang="en-US"/>
           </a:p>
@@ -2290,7 +2292,7 @@
           <a:lstStyle/>
           <a:p>
             <a:fld id="{45A1D096-1234-0C43-97F4-0FFC37CF404A}" type="datetimeFigureOut">
-              <a:t>5/26/16</a:t>
+              <a:t>5/29/16</a:t>
             </a:fld>
             <a:endParaRPr lang="en-US"/>
           </a:p>
@@ -2383,7 +2385,7 @@
           <a:lstStyle/>
           <a:p>
             <a:fld id="{45A1D096-1234-0C43-97F4-0FFC37CF404A}" type="datetimeFigureOut">
-              <a:t>5/26/16</a:t>
+              <a:t>5/29/16</a:t>
             </a:fld>
             <a:endParaRPr lang="en-US"/>
           </a:p>
@@ -2656,7 +2658,7 @@
           <a:lstStyle/>
           <a:p>
             <a:fld id="{45A1D096-1234-0C43-97F4-0FFC37CF404A}" type="datetimeFigureOut">
-              <a:t>5/26/16</a:t>
+              <a:t>5/29/16</a:t>
             </a:fld>
             <a:endParaRPr lang="en-US"/>
           </a:p>
@@ -2906,7 +2908,7 @@
           <a:lstStyle/>
           <a:p>
             <a:fld id="{45A1D096-1234-0C43-97F4-0FFC37CF404A}" type="datetimeFigureOut">
-              <a:t>5/26/16</a:t>
+              <a:t>5/29/16</a:t>
             </a:fld>
             <a:endParaRPr lang="en-US"/>
           </a:p>
@@ -3115,7 +3117,7 @@
           </a:lstStyle>
           <a:p>
             <a:fld id="{45A1D096-1234-0C43-97F4-0FFC37CF404A}" type="datetimeFigureOut">
-              <a:t>5/26/16</a:t>
+              <a:t>5/29/16</a:t>
             </a:fld>
             <a:endParaRPr lang="en-US"/>
           </a:p>
@@ -5280,7 +5282,7 @@
               <a:rPr lang="en-US">
                 <a:hlinkClick r:id="rId2"/>
               </a:rPr>
-              <a:t>https://github.com/hyperstate/hyperstate-docs/blob/master/wot-18may.pdf</a:t>
+              <a:t>https://github.com/connectIOT/iotivity-servient/blob/master/docs/abstract-transfer.pdf</a:t>
             </a:r>
             <a:endParaRPr lang="en-US"/>
           </a:p>
@@ -5340,7 +5342,7 @@
           <a:p>
             <a:r>
               <a:rPr lang="en-US"/>
-              <a:t>Modeling SmartThings Capabilities </a:t>
+              <a:t>Use case for SmartThings Models</a:t>
             </a:r>
           </a:p>
         </p:txBody>
@@ -5357,43 +5359,44 @@
         </p:nvSpPr>
         <p:spPr/>
         <p:txBody>
-          <a:bodyPr>
-            <a:normAutofit fontScale="92500" lnSpcReduction="20000"/>
-          </a:bodyPr>
-          <a:lstStyle/>
-          <a:p>
-            <a:r>
-              <a:rPr lang="en-US"/>
-              <a:t>Use oneiota to create a canonical model for an abstract SmartThings Capability with attribute and command type mappings to read/write/observe properties and actionInstance collections</a:t>
-            </a:r>
-          </a:p>
-          <a:p>
-            <a:r>
-              <a:rPr lang="en-US"/>
-              <a:t>It should be fairly easy to create the capability types by customizing the abstract model for capability types</a:t>
-            </a:r>
-          </a:p>
-          <a:p>
-            <a:r>
-              <a:rPr lang="en-US"/>
-              <a:t>Generate WoT Thing Description templates automatically from Capability Models</a:t>
-            </a:r>
-          </a:p>
-          <a:p>
-            <a:r>
-              <a:rPr lang="en-US"/>
-              <a:t>Can we bypass oneiota in the chain and construct resource instances from TD instances?</a:t>
-            </a:r>
-          </a:p>
-          <a:p>
-            <a:endParaRPr lang="en-US"/>
+          <a:bodyPr/>
+          <a:lstStyle/>
+          <a:p>
+            <a:r>
+              <a:rPr lang="en-US"/>
+              <a:t>IoTivity SmartThings Bridge</a:t>
+            </a:r>
+          </a:p>
+          <a:p>
+            <a:r>
+              <a:rPr lang="en-US"/>
+              <a:t>A SmartThing is a collection of Capabilities</a:t>
+            </a:r>
+          </a:p>
+          <a:p>
+            <a:r>
+              <a:rPr lang="en-US"/>
+              <a:t>Each Capability has a model</a:t>
+            </a:r>
+          </a:p>
+          <a:p>
+            <a:r>
+              <a:rPr lang="en-US"/>
+              <a:t>Discover SmartThings Things and construct IoTivity resource instances from capabilities</a:t>
+            </a:r>
+          </a:p>
+          <a:p>
+            <a:r>
+              <a:rPr lang="en-US"/>
+              <a:t>How does oneiota help? Make a W3C WoT Interaction model in RAML, customize the json-schema payloads for Capability types</a:t>
+            </a:r>
           </a:p>
         </p:txBody>
       </p:sp>
     </p:spTree>
     <p:extLst>
       <p:ext uri="{BB962C8B-B14F-4D97-AF65-F5344CB8AC3E}">
-        <p14:creationId xmlns:p14="http://schemas.microsoft.com/office/powerpoint/2010/main" val="2740283266"/>
+        <p14:creationId xmlns:p14="http://schemas.microsoft.com/office/powerpoint/2010/main" val="89360275"/>
       </p:ext>
     </p:extLst>
   </p:cSld>
@@ -5437,7 +5440,7 @@
           <a:p>
             <a:r>
               <a:rPr lang="en-US"/>
-              <a:t>Use case for SmartThings Models</a:t>
+              <a:t>Modeling SmartThings Capabilities </a:t>
             </a:r>
           </a:p>
         </p:txBody>
@@ -5454,44 +5457,276 @@
         </p:nvSpPr>
         <p:spPr/>
         <p:txBody>
-          <a:bodyPr/>
-          <a:lstStyle/>
-          <a:p>
-            <a:r>
-              <a:rPr lang="en-US"/>
-              <a:t>IoTivity SmartThings Bridge</a:t>
-            </a:r>
-          </a:p>
-          <a:p>
-            <a:r>
-              <a:rPr lang="en-US"/>
-              <a:t>A SmartThing is a collection of Capabilities</a:t>
-            </a:r>
-          </a:p>
-          <a:p>
-            <a:r>
-              <a:rPr lang="en-US"/>
-              <a:t>Each Capability has a model</a:t>
-            </a:r>
-          </a:p>
-          <a:p>
-            <a:r>
-              <a:rPr lang="en-US"/>
-              <a:t>Discover SmartThings Things and construct IoTivity resource instances from capabilities</a:t>
-            </a:r>
-          </a:p>
-          <a:p>
-            <a:r>
-              <a:rPr lang="en-US"/>
-              <a:t>How does oneiota help?</a:t>
-            </a:r>
+          <a:bodyPr>
+            <a:normAutofit fontScale="92500"/>
+          </a:bodyPr>
+          <a:lstStyle/>
+          <a:p>
+            <a:r>
+              <a:rPr lang="en-US"/>
+              <a:t>Use oneiota to create a canonical model for mapping an abstract SmartThings Capability using the WoT Interaction Model </a:t>
+            </a:r>
+          </a:p>
+          <a:p>
+            <a:r>
+              <a:rPr lang="en-US"/>
+              <a:t>It should be fairly easy to create the capability types by customizing payloads using json-schema</a:t>
+            </a:r>
+          </a:p>
+          <a:p>
+            <a:r>
+              <a:rPr lang="en-US"/>
+              <a:t>Use WoT Thing Descriptions and RAML Capability Models to construct instances?</a:t>
+            </a:r>
+          </a:p>
+          <a:p>
+            <a:r>
+              <a:rPr lang="en-US"/>
+              <a:t>Where are the payloads differentiated? RAML (rt), TD, or somewhere else? </a:t>
+            </a:r>
+            <a:endParaRPr lang="en-US"/>
+          </a:p>
+          <a:p>
+            <a:endParaRPr lang="en-US"/>
           </a:p>
         </p:txBody>
       </p:sp>
     </p:spTree>
     <p:extLst>
       <p:ext uri="{BB962C8B-B14F-4D97-AF65-F5344CB8AC3E}">
-        <p14:creationId xmlns:p14="http://schemas.microsoft.com/office/powerpoint/2010/main" val="89360275"/>
+        <p14:creationId xmlns:p14="http://schemas.microsoft.com/office/powerpoint/2010/main" val="2740283266"/>
+      </p:ext>
+    </p:extLst>
+  </p:cSld>
+  <p:clrMapOvr>
+    <a:masterClrMapping/>
+  </p:clrMapOvr>
+</p:sld>
+</file>
+
+<file path=ppt/slides/slide8.xml><?xml version="1.0" encoding="utf-8"?>
+<p:sld xmlns:a="http://schemas.openxmlformats.org/drawingml/2006/main" xmlns:r="http://schemas.openxmlformats.org/officeDocument/2006/relationships" xmlns:p="http://schemas.openxmlformats.org/presentationml/2006/main">
+  <p:cSld>
+    <p:spTree>
+      <p:nvGrpSpPr>
+        <p:cNvPr id="1" name=""/>
+        <p:cNvGrpSpPr/>
+        <p:nvPr/>
+      </p:nvGrpSpPr>
+      <p:grpSpPr>
+        <a:xfrm>
+          <a:off x="0" y="0"/>
+          <a:ext cx="0" cy="0"/>
+          <a:chOff x="0" y="0"/>
+          <a:chExt cx="0" cy="0"/>
+        </a:xfrm>
+      </p:grpSpPr>
+      <p:sp>
+        <p:nvSpPr>
+          <p:cNvPr id="2" name="Title 1"/>
+          <p:cNvSpPr>
+            <a:spLocks noGrp="1"/>
+          </p:cNvSpPr>
+          <p:nvPr>
+            <p:ph type="title"/>
+          </p:nvPr>
+        </p:nvSpPr>
+        <p:spPr/>
+        <p:txBody>
+          <a:bodyPr/>
+          <a:lstStyle/>
+          <a:p>
+            <a:r>
+              <a:rPr lang="en-US"/>
+              <a:t>Modeling Process</a:t>
+            </a:r>
+          </a:p>
+        </p:txBody>
+      </p:sp>
+      <p:sp>
+        <p:nvSpPr>
+          <p:cNvPr id="3" name="Content Placeholder 2"/>
+          <p:cNvSpPr>
+            <a:spLocks noGrp="1"/>
+          </p:cNvSpPr>
+          <p:nvPr>
+            <p:ph idx="1"/>
+          </p:nvPr>
+        </p:nvSpPr>
+        <p:spPr/>
+        <p:txBody>
+          <a:bodyPr>
+            <a:normAutofit fontScale="92500" lnSpcReduction="10000"/>
+          </a:bodyPr>
+          <a:lstStyle/>
+          <a:p>
+            <a:r>
+              <a:rPr lang="en-US"/>
+              <a:t>Map ST Capabilities to Thing Descriptions</a:t>
+            </a:r>
+          </a:p>
+          <a:p>
+            <a:r>
+              <a:rPr lang="en-US"/>
+              <a:t>Compose Thing TDs from the Capability TDs</a:t>
+            </a:r>
+          </a:p>
+          <a:p>
+            <a:r>
+              <a:rPr lang="en-US"/>
+              <a:t>Capability TD hrefs point to action, event, and property instances exposed by IoTivity</a:t>
+            </a:r>
+          </a:p>
+          <a:p>
+            <a:r>
+              <a:rPr lang="en-US"/>
+              <a:t>IoTivity exposes devices as collections of Capability models, each containing resources representing WoT properties, actions, and events </a:t>
+            </a:r>
+          </a:p>
+          <a:p>
+            <a:r>
+              <a:rPr lang="en-US"/>
+              <a:t>Capability types differ only by payload schema and identifier values</a:t>
+            </a:r>
+          </a:p>
+        </p:txBody>
+      </p:sp>
+    </p:spTree>
+    <p:extLst>
+      <p:ext uri="{BB962C8B-B14F-4D97-AF65-F5344CB8AC3E}">
+        <p14:creationId xmlns:p14="http://schemas.microsoft.com/office/powerpoint/2010/main" val="4216780841"/>
+      </p:ext>
+    </p:extLst>
+  </p:cSld>
+  <p:clrMapOvr>
+    <a:masterClrMapping/>
+  </p:clrMapOvr>
+</p:sld>
+</file>
+
+<file path=ppt/slides/slide9.xml><?xml version="1.0" encoding="utf-8"?>
+<p:sld xmlns:a="http://schemas.openxmlformats.org/drawingml/2006/main" xmlns:r="http://schemas.openxmlformats.org/officeDocument/2006/relationships" xmlns:p="http://schemas.openxmlformats.org/presentationml/2006/main">
+  <p:cSld>
+    <p:spTree>
+      <p:nvGrpSpPr>
+        <p:cNvPr id="1" name=""/>
+        <p:cNvGrpSpPr/>
+        <p:nvPr/>
+      </p:nvGrpSpPr>
+      <p:grpSpPr>
+        <a:xfrm>
+          <a:off x="0" y="0"/>
+          <a:ext cx="0" cy="0"/>
+          <a:chOff x="0" y="0"/>
+          <a:chExt cx="0" cy="0"/>
+        </a:xfrm>
+      </p:grpSpPr>
+      <p:sp>
+        <p:nvSpPr>
+          <p:cNvPr id="2" name="Title 1"/>
+          <p:cNvSpPr>
+            <a:spLocks noGrp="1"/>
+          </p:cNvSpPr>
+          <p:nvPr>
+            <p:ph type="title"/>
+          </p:nvPr>
+        </p:nvSpPr>
+        <p:spPr/>
+        <p:txBody>
+          <a:bodyPr/>
+          <a:lstStyle/>
+          <a:p>
+            <a:r>
+              <a:rPr lang="en-US"/>
+              <a:t>OCF WoT Device Bridge</a:t>
+            </a:r>
+          </a:p>
+        </p:txBody>
+      </p:sp>
+      <p:sp>
+        <p:nvSpPr>
+          <p:cNvPr id="3" name="Content Placeholder 2"/>
+          <p:cNvSpPr>
+            <a:spLocks noGrp="1"/>
+          </p:cNvSpPr>
+          <p:nvPr>
+            <p:ph idx="1"/>
+          </p:nvPr>
+        </p:nvSpPr>
+        <p:spPr>
+          <a:xfrm>
+            <a:off x="457200" y="1427732"/>
+            <a:ext cx="8229600" cy="4879334"/>
+          </a:xfrm>
+        </p:spPr>
+        <p:txBody>
+          <a:bodyPr>
+            <a:normAutofit lnSpcReduction="10000"/>
+          </a:bodyPr>
+          <a:lstStyle/>
+          <a:p>
+            <a:r>
+              <a:rPr lang="en-US"/>
+              <a:t>Devices are registered in /oic/res/, with rich links to collections of Capabilities </a:t>
+            </a:r>
+            <a:r>
+              <a:rPr lang="en-US"/>
+              <a:t> </a:t>
+            </a:r>
+          </a:p>
+          <a:p>
+            <a:r>
+              <a:rPr lang="en-US"/>
+              <a:t>Capabilities are composed of OCF resource types that model WoT TD entities according to the proposed protocol binding and workflows</a:t>
+            </a:r>
+          </a:p>
+          <a:p>
+            <a:pPr lvl="1"/>
+            <a:r>
+              <a:rPr lang="en-US"/>
+              <a:t>atl.wot.property</a:t>
+            </a:r>
+          </a:p>
+          <a:p>
+            <a:pPr lvl="1"/>
+            <a:r>
+              <a:rPr lang="en-US"/>
+              <a:t>atl.wot.action</a:t>
+            </a:r>
+          </a:p>
+          <a:p>
+            <a:pPr lvl="1"/>
+            <a:r>
+              <a:rPr lang="en-US"/>
+              <a:t>atl.wot.event</a:t>
+            </a:r>
+          </a:p>
+          <a:p>
+            <a:pPr lvl="1"/>
+            <a:r>
+              <a:rPr lang="en-US"/>
+              <a:t>atl.wot.actioninstance</a:t>
+            </a:r>
+          </a:p>
+          <a:p>
+            <a:pPr lvl="1"/>
+            <a:r>
+              <a:rPr lang="en-US"/>
+              <a:t>atl.wot.subscription</a:t>
+            </a:r>
+          </a:p>
+          <a:p>
+            <a:endParaRPr lang="en-US"/>
+          </a:p>
+          <a:p>
+            <a:endParaRPr lang="en-US"/>
+          </a:p>
+        </p:txBody>
+      </p:sp>
+    </p:spTree>
+    <p:extLst>
+      <p:ext uri="{BB962C8B-B14F-4D97-AF65-F5344CB8AC3E}">
+        <p14:creationId xmlns:p14="http://schemas.microsoft.com/office/powerpoint/2010/main" val="1572365808"/>
       </p:ext>
     </p:extLst>
   </p:cSld>

</xml_diff>

<commit_message>
Update servient slides, add docs
Added the basic device types agreed on for IoTX and iot.schema.org
collaborations
</commit_message>
<xml_diff>
--- a/docs/st-servient.pptx
+++ b/docs/st-servient.pptx
@@ -5,7 +5,7 @@
     <p:sldMasterId id="2147483648" r:id="rId1"/>
   </p:sldMasterIdLst>
   <p:notesMasterIdLst>
-    <p:notesMasterId r:id="rId11"/>
+    <p:notesMasterId r:id="rId12"/>
   </p:notesMasterIdLst>
   <p:sldIdLst>
     <p:sldId id="256" r:id="rId2"/>
@@ -17,6 +17,7 @@
     <p:sldId id="261" r:id="rId8"/>
     <p:sldId id="263" r:id="rId9"/>
     <p:sldId id="264" r:id="rId10"/>
+    <p:sldId id="265" r:id="rId11"/>
   </p:sldIdLst>
   <p:sldSz cx="9144000" cy="6858000" type="screen4x3"/>
   <p:notesSz cx="6858000" cy="9144000"/>
@@ -3548,6 +3549,1722 @@
 </p:sld>
 </file>
 
+<file path=ppt/slides/slide10.xml><?xml version="1.0" encoding="utf-8"?>
+<p:sld xmlns:a="http://schemas.openxmlformats.org/drawingml/2006/main" xmlns:r="http://schemas.openxmlformats.org/officeDocument/2006/relationships" xmlns:p="http://schemas.openxmlformats.org/presentationml/2006/main">
+  <p:cSld>
+    <p:spTree>
+      <p:nvGrpSpPr>
+        <p:cNvPr id="1" name=""/>
+        <p:cNvGrpSpPr/>
+        <p:nvPr/>
+      </p:nvGrpSpPr>
+      <p:grpSpPr>
+        <a:xfrm>
+          <a:off x="0" y="0"/>
+          <a:ext cx="0" cy="0"/>
+          <a:chOff x="0" y="0"/>
+          <a:chExt cx="0" cy="0"/>
+        </a:xfrm>
+      </p:grpSpPr>
+      <p:sp>
+        <p:nvSpPr>
+          <p:cNvPr id="2" name="Title 1"/>
+          <p:cNvSpPr>
+            <a:spLocks noGrp="1"/>
+          </p:cNvSpPr>
+          <p:nvPr>
+            <p:ph type="title"/>
+          </p:nvPr>
+        </p:nvSpPr>
+        <p:spPr/>
+        <p:txBody>
+          <a:bodyPr>
+            <a:normAutofit fontScale="90000"/>
+          </a:bodyPr>
+          <a:lstStyle/>
+          <a:p>
+            <a:r>
+              <a:rPr lang="en-US"/>
+              <a:t>SmartThings </a:t>
+            </a:r>
+            <a:r>
+              <a:rPr lang="en-US"/>
+              <a:t>OCF </a:t>
+            </a:r>
+            <a:r>
+              <a:rPr lang="en-US"/>
+              <a:t>Device Bridge Mapping to Thing Description</a:t>
+            </a:r>
+          </a:p>
+        </p:txBody>
+      </p:sp>
+      <p:sp>
+        <p:nvSpPr>
+          <p:cNvPr id="4" name="Oval 3"/>
+          <p:cNvSpPr/>
+          <p:nvPr/>
+        </p:nvSpPr>
+        <p:spPr>
+          <a:xfrm>
+            <a:off x="824794" y="2577909"/>
+            <a:ext cx="885850" cy="875092"/>
+          </a:xfrm>
+          <a:prstGeom prst="ellipse">
+            <a:avLst/>
+          </a:prstGeom>
+          <a:noFill/>
+          <a:ln>
+            <a:solidFill>
+              <a:srgbClr val="1C3339"/>
+            </a:solidFill>
+          </a:ln>
+        </p:spPr>
+        <p:style>
+          <a:lnRef idx="1">
+            <a:schemeClr val="accent1"/>
+          </a:lnRef>
+          <a:fillRef idx="3">
+            <a:schemeClr val="accent1"/>
+          </a:fillRef>
+          <a:effectRef idx="2">
+            <a:schemeClr val="accent1"/>
+          </a:effectRef>
+          <a:fontRef idx="minor">
+            <a:schemeClr val="lt1"/>
+          </a:fontRef>
+        </p:style>
+        <p:txBody>
+          <a:bodyPr rtlCol="0" anchor="ctr"/>
+          <a:lstStyle/>
+          <a:p>
+            <a:pPr algn="ctr"/>
+            <a:endParaRPr lang="en-US"/>
+          </a:p>
+        </p:txBody>
+      </p:sp>
+      <p:sp>
+        <p:nvSpPr>
+          <p:cNvPr id="5" name="Rectangle 4"/>
+          <p:cNvSpPr/>
+          <p:nvPr/>
+        </p:nvSpPr>
+        <p:spPr>
+          <a:xfrm>
+            <a:off x="1048302" y="2556564"/>
+            <a:ext cx="1013923" cy="224109"/>
+          </a:xfrm>
+          <a:prstGeom prst="rect">
+            <a:avLst/>
+          </a:prstGeom>
+          <a:solidFill>
+            <a:srgbClr val="FFFFFF"/>
+          </a:solidFill>
+          <a:ln>
+            <a:solidFill>
+              <a:srgbClr val="1C3339"/>
+            </a:solidFill>
+          </a:ln>
+        </p:spPr>
+        <p:style>
+          <a:lnRef idx="1">
+            <a:schemeClr val="accent1"/>
+          </a:lnRef>
+          <a:fillRef idx="3">
+            <a:schemeClr val="accent1"/>
+          </a:fillRef>
+          <a:effectRef idx="2">
+            <a:schemeClr val="accent1"/>
+          </a:effectRef>
+          <a:fontRef idx="minor">
+            <a:schemeClr val="lt1"/>
+          </a:fontRef>
+        </p:style>
+        <p:txBody>
+          <a:bodyPr rtlCol="0" anchor="ctr"/>
+          <a:lstStyle/>
+          <a:p>
+            <a:pPr algn="ctr"/>
+            <a:r>
+              <a:rPr lang="en-US" sz="1600">
+                <a:solidFill>
+                  <a:schemeClr val="tx1"/>
+                </a:solidFill>
+              </a:rPr>
+              <a:t>Capability</a:t>
+            </a:r>
+          </a:p>
+        </p:txBody>
+      </p:sp>
+      <p:sp>
+        <p:nvSpPr>
+          <p:cNvPr id="6" name="Rectangle 5"/>
+          <p:cNvSpPr/>
+          <p:nvPr/>
+        </p:nvSpPr>
+        <p:spPr>
+          <a:xfrm>
+            <a:off x="1200702" y="2708964"/>
+            <a:ext cx="1013923" cy="224109"/>
+          </a:xfrm>
+          <a:prstGeom prst="rect">
+            <a:avLst/>
+          </a:prstGeom>
+          <a:solidFill>
+            <a:srgbClr val="FFFFFF"/>
+          </a:solidFill>
+          <a:ln>
+            <a:solidFill>
+              <a:srgbClr val="1C3339"/>
+            </a:solidFill>
+          </a:ln>
+        </p:spPr>
+        <p:style>
+          <a:lnRef idx="1">
+            <a:schemeClr val="accent1"/>
+          </a:lnRef>
+          <a:fillRef idx="3">
+            <a:schemeClr val="accent1"/>
+          </a:fillRef>
+          <a:effectRef idx="2">
+            <a:schemeClr val="accent1"/>
+          </a:effectRef>
+          <a:fontRef idx="minor">
+            <a:schemeClr val="lt1"/>
+          </a:fontRef>
+        </p:style>
+        <p:txBody>
+          <a:bodyPr rtlCol="0" anchor="ctr"/>
+          <a:lstStyle/>
+          <a:p>
+            <a:pPr algn="ctr"/>
+            <a:r>
+              <a:rPr lang="en-US" sz="1600">
+                <a:solidFill>
+                  <a:schemeClr val="tx1"/>
+                </a:solidFill>
+              </a:rPr>
+              <a:t>Capability</a:t>
+            </a:r>
+          </a:p>
+        </p:txBody>
+      </p:sp>
+      <p:sp>
+        <p:nvSpPr>
+          <p:cNvPr id="7" name="Rectangle 6"/>
+          <p:cNvSpPr/>
+          <p:nvPr/>
+        </p:nvSpPr>
+        <p:spPr>
+          <a:xfrm>
+            <a:off x="1353102" y="2861364"/>
+            <a:ext cx="1013923" cy="224109"/>
+          </a:xfrm>
+          <a:prstGeom prst="rect">
+            <a:avLst/>
+          </a:prstGeom>
+          <a:solidFill>
+            <a:srgbClr val="FFFFFF"/>
+          </a:solidFill>
+          <a:ln>
+            <a:solidFill>
+              <a:srgbClr val="1C3339"/>
+            </a:solidFill>
+          </a:ln>
+        </p:spPr>
+        <p:style>
+          <a:lnRef idx="1">
+            <a:schemeClr val="accent1"/>
+          </a:lnRef>
+          <a:fillRef idx="3">
+            <a:schemeClr val="accent1"/>
+          </a:fillRef>
+          <a:effectRef idx="2">
+            <a:schemeClr val="accent1"/>
+          </a:effectRef>
+          <a:fontRef idx="minor">
+            <a:schemeClr val="lt1"/>
+          </a:fontRef>
+        </p:style>
+        <p:txBody>
+          <a:bodyPr rtlCol="0" anchor="ctr"/>
+          <a:lstStyle/>
+          <a:p>
+            <a:pPr algn="ctr"/>
+            <a:r>
+              <a:rPr lang="en-US" sz="1600">
+                <a:solidFill>
+                  <a:schemeClr val="tx1"/>
+                </a:solidFill>
+              </a:rPr>
+              <a:t>Capability</a:t>
+            </a:r>
+          </a:p>
+        </p:txBody>
+      </p:sp>
+      <p:sp>
+        <p:nvSpPr>
+          <p:cNvPr id="8" name="Rectangle 7"/>
+          <p:cNvSpPr/>
+          <p:nvPr/>
+        </p:nvSpPr>
+        <p:spPr>
+          <a:xfrm>
+            <a:off x="2122965" y="3859835"/>
+            <a:ext cx="1013923" cy="224109"/>
+          </a:xfrm>
+          <a:prstGeom prst="rect">
+            <a:avLst/>
+          </a:prstGeom>
+          <a:solidFill>
+            <a:srgbClr val="FFFFFF"/>
+          </a:solidFill>
+          <a:ln>
+            <a:solidFill>
+              <a:srgbClr val="1C3339"/>
+            </a:solidFill>
+          </a:ln>
+        </p:spPr>
+        <p:style>
+          <a:lnRef idx="1">
+            <a:schemeClr val="accent1"/>
+          </a:lnRef>
+          <a:fillRef idx="3">
+            <a:schemeClr val="accent1"/>
+          </a:fillRef>
+          <a:effectRef idx="2">
+            <a:schemeClr val="accent1"/>
+          </a:effectRef>
+          <a:fontRef idx="minor">
+            <a:schemeClr val="lt1"/>
+          </a:fontRef>
+        </p:style>
+        <p:txBody>
+          <a:bodyPr rtlCol="0" anchor="ctr"/>
+          <a:lstStyle/>
+          <a:p>
+            <a:pPr algn="ctr"/>
+            <a:r>
+              <a:rPr lang="en-US" sz="1600">
+                <a:solidFill>
+                  <a:schemeClr val="tx1"/>
+                </a:solidFill>
+              </a:rPr>
+              <a:t>Device</a:t>
+            </a:r>
+          </a:p>
+        </p:txBody>
+      </p:sp>
+      <p:sp>
+        <p:nvSpPr>
+          <p:cNvPr id="9" name="Rectangle 8"/>
+          <p:cNvSpPr/>
+          <p:nvPr/>
+        </p:nvSpPr>
+        <p:spPr>
+          <a:xfrm>
+            <a:off x="705359" y="1920906"/>
+            <a:ext cx="1417606" cy="646331"/>
+          </a:xfrm>
+          <a:prstGeom prst="rect">
+            <a:avLst/>
+          </a:prstGeom>
+        </p:spPr>
+        <p:txBody>
+          <a:bodyPr wrap="square">
+            <a:spAutoFit/>
+          </a:bodyPr>
+          <a:lstStyle/>
+          <a:p>
+            <a:pPr algn="ctr"/>
+            <a:r>
+              <a:rPr lang="en-US"/>
+              <a:t>SmartThings Devices</a:t>
+            </a:r>
+            <a:endParaRPr lang="en-US"/>
+          </a:p>
+        </p:txBody>
+      </p:sp>
+      <p:sp>
+        <p:nvSpPr>
+          <p:cNvPr id="10" name="Rectangle 9"/>
+          <p:cNvSpPr/>
+          <p:nvPr/>
+        </p:nvSpPr>
+        <p:spPr>
+          <a:xfrm>
+            <a:off x="2122965" y="4083944"/>
+            <a:ext cx="1013923" cy="224109"/>
+          </a:xfrm>
+          <a:prstGeom prst="rect">
+            <a:avLst/>
+          </a:prstGeom>
+          <a:solidFill>
+            <a:srgbClr val="FFFFFF"/>
+          </a:solidFill>
+          <a:ln>
+            <a:solidFill>
+              <a:srgbClr val="1C3339"/>
+            </a:solidFill>
+          </a:ln>
+        </p:spPr>
+        <p:style>
+          <a:lnRef idx="1">
+            <a:schemeClr val="accent1"/>
+          </a:lnRef>
+          <a:fillRef idx="3">
+            <a:schemeClr val="accent1"/>
+          </a:fillRef>
+          <a:effectRef idx="2">
+            <a:schemeClr val="accent1"/>
+          </a:effectRef>
+          <a:fontRef idx="minor">
+            <a:schemeClr val="lt1"/>
+          </a:fontRef>
+        </p:style>
+        <p:txBody>
+          <a:bodyPr rtlCol="0" anchor="ctr"/>
+          <a:lstStyle/>
+          <a:p>
+            <a:pPr algn="ctr"/>
+            <a:r>
+              <a:rPr lang="en-US" sz="1600">
+                <a:solidFill>
+                  <a:schemeClr val="tx1"/>
+                </a:solidFill>
+              </a:rPr>
+              <a:t>Device</a:t>
+            </a:r>
+          </a:p>
+        </p:txBody>
+      </p:sp>
+      <p:sp>
+        <p:nvSpPr>
+          <p:cNvPr id="11" name="Rectangle 10"/>
+          <p:cNvSpPr/>
+          <p:nvPr/>
+        </p:nvSpPr>
+        <p:spPr>
+          <a:xfrm>
+            <a:off x="2122965" y="4308053"/>
+            <a:ext cx="1013923" cy="224109"/>
+          </a:xfrm>
+          <a:prstGeom prst="rect">
+            <a:avLst/>
+          </a:prstGeom>
+          <a:solidFill>
+            <a:srgbClr val="FFFFFF"/>
+          </a:solidFill>
+          <a:ln>
+            <a:solidFill>
+              <a:srgbClr val="1C3339"/>
+            </a:solidFill>
+          </a:ln>
+        </p:spPr>
+        <p:style>
+          <a:lnRef idx="1">
+            <a:schemeClr val="accent1"/>
+          </a:lnRef>
+          <a:fillRef idx="3">
+            <a:schemeClr val="accent1"/>
+          </a:fillRef>
+          <a:effectRef idx="2">
+            <a:schemeClr val="accent1"/>
+          </a:effectRef>
+          <a:fontRef idx="minor">
+            <a:schemeClr val="lt1"/>
+          </a:fontRef>
+        </p:style>
+        <p:txBody>
+          <a:bodyPr rtlCol="0" anchor="ctr"/>
+          <a:lstStyle/>
+          <a:p>
+            <a:pPr algn="ctr"/>
+            <a:r>
+              <a:rPr lang="en-US" sz="1600">
+                <a:solidFill>
+                  <a:schemeClr val="tx1"/>
+                </a:solidFill>
+              </a:rPr>
+              <a:t>Device</a:t>
+            </a:r>
+          </a:p>
+        </p:txBody>
+      </p:sp>
+      <p:sp>
+        <p:nvSpPr>
+          <p:cNvPr id="12" name="Rectangle 11"/>
+          <p:cNvSpPr/>
+          <p:nvPr/>
+        </p:nvSpPr>
+        <p:spPr>
+          <a:xfrm>
+            <a:off x="2122965" y="4532162"/>
+            <a:ext cx="1013923" cy="224109"/>
+          </a:xfrm>
+          <a:prstGeom prst="rect">
+            <a:avLst/>
+          </a:prstGeom>
+          <a:solidFill>
+            <a:srgbClr val="FFFFFF"/>
+          </a:solidFill>
+          <a:ln>
+            <a:solidFill>
+              <a:srgbClr val="1C3339"/>
+            </a:solidFill>
+          </a:ln>
+        </p:spPr>
+        <p:style>
+          <a:lnRef idx="1">
+            <a:schemeClr val="accent1"/>
+          </a:lnRef>
+          <a:fillRef idx="3">
+            <a:schemeClr val="accent1"/>
+          </a:fillRef>
+          <a:effectRef idx="2">
+            <a:schemeClr val="accent1"/>
+          </a:effectRef>
+          <a:fontRef idx="minor">
+            <a:schemeClr val="lt1"/>
+          </a:fontRef>
+        </p:style>
+        <p:txBody>
+          <a:bodyPr rtlCol="0" anchor="ctr"/>
+          <a:lstStyle/>
+          <a:p>
+            <a:pPr algn="ctr"/>
+            <a:r>
+              <a:rPr lang="en-US" sz="1600">
+                <a:solidFill>
+                  <a:schemeClr val="tx1"/>
+                </a:solidFill>
+              </a:rPr>
+              <a:t>Device</a:t>
+            </a:r>
+          </a:p>
+        </p:txBody>
+      </p:sp>
+      <p:sp>
+        <p:nvSpPr>
+          <p:cNvPr id="13" name="Rectangle 12"/>
+          <p:cNvSpPr/>
+          <p:nvPr/>
+        </p:nvSpPr>
+        <p:spPr>
+          <a:xfrm>
+            <a:off x="3746187" y="4031772"/>
+            <a:ext cx="1013923" cy="224109"/>
+          </a:xfrm>
+          <a:prstGeom prst="rect">
+            <a:avLst/>
+          </a:prstGeom>
+          <a:solidFill>
+            <a:srgbClr val="FFFFFF"/>
+          </a:solidFill>
+          <a:ln>
+            <a:solidFill>
+              <a:srgbClr val="1C3339"/>
+            </a:solidFill>
+          </a:ln>
+        </p:spPr>
+        <p:style>
+          <a:lnRef idx="1">
+            <a:schemeClr val="accent1"/>
+          </a:lnRef>
+          <a:fillRef idx="3">
+            <a:schemeClr val="accent1"/>
+          </a:fillRef>
+          <a:effectRef idx="2">
+            <a:schemeClr val="accent1"/>
+          </a:effectRef>
+          <a:fontRef idx="minor">
+            <a:schemeClr val="lt1"/>
+          </a:fontRef>
+        </p:style>
+        <p:txBody>
+          <a:bodyPr rtlCol="0" anchor="ctr"/>
+          <a:lstStyle/>
+          <a:p>
+            <a:pPr algn="ctr"/>
+            <a:r>
+              <a:rPr lang="en-US" sz="1600">
+                <a:solidFill>
+                  <a:schemeClr val="tx1"/>
+                </a:solidFill>
+              </a:rPr>
+              <a:t>Capability</a:t>
+            </a:r>
+          </a:p>
+        </p:txBody>
+      </p:sp>
+      <p:sp>
+        <p:nvSpPr>
+          <p:cNvPr id="14" name="Rectangle 13"/>
+          <p:cNvSpPr/>
+          <p:nvPr/>
+        </p:nvSpPr>
+        <p:spPr>
+          <a:xfrm>
+            <a:off x="3746187" y="4255881"/>
+            <a:ext cx="1013923" cy="224109"/>
+          </a:xfrm>
+          <a:prstGeom prst="rect">
+            <a:avLst/>
+          </a:prstGeom>
+          <a:solidFill>
+            <a:srgbClr val="FFFFFF"/>
+          </a:solidFill>
+          <a:ln>
+            <a:solidFill>
+              <a:srgbClr val="1C3339"/>
+            </a:solidFill>
+          </a:ln>
+        </p:spPr>
+        <p:style>
+          <a:lnRef idx="1">
+            <a:schemeClr val="accent1"/>
+          </a:lnRef>
+          <a:fillRef idx="3">
+            <a:schemeClr val="accent1"/>
+          </a:fillRef>
+          <a:effectRef idx="2">
+            <a:schemeClr val="accent1"/>
+          </a:effectRef>
+          <a:fontRef idx="minor">
+            <a:schemeClr val="lt1"/>
+          </a:fontRef>
+        </p:style>
+        <p:txBody>
+          <a:bodyPr rtlCol="0" anchor="ctr"/>
+          <a:lstStyle/>
+          <a:p>
+            <a:pPr algn="ctr"/>
+            <a:r>
+              <a:rPr lang="en-US" sz="1600">
+                <a:solidFill>
+                  <a:schemeClr val="tx1"/>
+                </a:solidFill>
+              </a:rPr>
+              <a:t>Capability</a:t>
+            </a:r>
+          </a:p>
+        </p:txBody>
+      </p:sp>
+      <p:sp>
+        <p:nvSpPr>
+          <p:cNvPr id="15" name="Rectangle 14"/>
+          <p:cNvSpPr/>
+          <p:nvPr/>
+        </p:nvSpPr>
+        <p:spPr>
+          <a:xfrm>
+            <a:off x="3746187" y="4480253"/>
+            <a:ext cx="1013923" cy="224109"/>
+          </a:xfrm>
+          <a:prstGeom prst="rect">
+            <a:avLst/>
+          </a:prstGeom>
+          <a:solidFill>
+            <a:srgbClr val="FFFFFF"/>
+          </a:solidFill>
+          <a:ln>
+            <a:solidFill>
+              <a:srgbClr val="1C3339"/>
+            </a:solidFill>
+          </a:ln>
+        </p:spPr>
+        <p:style>
+          <a:lnRef idx="1">
+            <a:schemeClr val="accent1"/>
+          </a:lnRef>
+          <a:fillRef idx="3">
+            <a:schemeClr val="accent1"/>
+          </a:fillRef>
+          <a:effectRef idx="2">
+            <a:schemeClr val="accent1"/>
+          </a:effectRef>
+          <a:fontRef idx="minor">
+            <a:schemeClr val="lt1"/>
+          </a:fontRef>
+        </p:style>
+        <p:txBody>
+          <a:bodyPr rtlCol="0" anchor="ctr"/>
+          <a:lstStyle/>
+          <a:p>
+            <a:pPr algn="ctr"/>
+            <a:r>
+              <a:rPr lang="en-US" sz="1600">
+                <a:solidFill>
+                  <a:schemeClr val="tx1"/>
+                </a:solidFill>
+              </a:rPr>
+              <a:t>Capability</a:t>
+            </a:r>
+          </a:p>
+        </p:txBody>
+      </p:sp>
+      <p:sp>
+        <p:nvSpPr>
+          <p:cNvPr id="16" name="Rectangle 15"/>
+          <p:cNvSpPr/>
+          <p:nvPr/>
+        </p:nvSpPr>
+        <p:spPr>
+          <a:xfrm>
+            <a:off x="3746187" y="4704362"/>
+            <a:ext cx="1013923" cy="224109"/>
+          </a:xfrm>
+          <a:prstGeom prst="rect">
+            <a:avLst/>
+          </a:prstGeom>
+          <a:solidFill>
+            <a:srgbClr val="FFFFFF"/>
+          </a:solidFill>
+          <a:ln>
+            <a:solidFill>
+              <a:srgbClr val="1C3339"/>
+            </a:solidFill>
+          </a:ln>
+        </p:spPr>
+        <p:style>
+          <a:lnRef idx="1">
+            <a:schemeClr val="accent1"/>
+          </a:lnRef>
+          <a:fillRef idx="3">
+            <a:schemeClr val="accent1"/>
+          </a:fillRef>
+          <a:effectRef idx="2">
+            <a:schemeClr val="accent1"/>
+          </a:effectRef>
+          <a:fontRef idx="minor">
+            <a:schemeClr val="lt1"/>
+          </a:fontRef>
+        </p:style>
+        <p:txBody>
+          <a:bodyPr rtlCol="0" anchor="ctr"/>
+          <a:lstStyle/>
+          <a:p>
+            <a:pPr algn="ctr"/>
+            <a:r>
+              <a:rPr lang="en-US" sz="1600">
+                <a:solidFill>
+                  <a:schemeClr val="tx1"/>
+                </a:solidFill>
+              </a:rPr>
+              <a:t>Capability</a:t>
+            </a:r>
+          </a:p>
+        </p:txBody>
+      </p:sp>
+      <p:sp>
+        <p:nvSpPr>
+          <p:cNvPr id="17" name="Rectangle 16"/>
+          <p:cNvSpPr/>
+          <p:nvPr/>
+        </p:nvSpPr>
+        <p:spPr>
+          <a:xfrm>
+            <a:off x="5316830" y="4010819"/>
+            <a:ext cx="1013923" cy="224109"/>
+          </a:xfrm>
+          <a:prstGeom prst="rect">
+            <a:avLst/>
+          </a:prstGeom>
+          <a:solidFill>
+            <a:srgbClr val="FFFFFF"/>
+          </a:solidFill>
+          <a:ln>
+            <a:solidFill>
+              <a:srgbClr val="1C3339"/>
+            </a:solidFill>
+          </a:ln>
+        </p:spPr>
+        <p:style>
+          <a:lnRef idx="1">
+            <a:schemeClr val="accent1"/>
+          </a:lnRef>
+          <a:fillRef idx="3">
+            <a:schemeClr val="accent1"/>
+          </a:fillRef>
+          <a:effectRef idx="2">
+            <a:schemeClr val="accent1"/>
+          </a:effectRef>
+          <a:fontRef idx="minor">
+            <a:schemeClr val="lt1"/>
+          </a:fontRef>
+        </p:style>
+        <p:txBody>
+          <a:bodyPr rtlCol="0" anchor="ctr"/>
+          <a:lstStyle/>
+          <a:p>
+            <a:pPr algn="ctr"/>
+            <a:r>
+              <a:rPr lang="en-US" sz="1600">
+                <a:solidFill>
+                  <a:schemeClr val="tx1"/>
+                </a:solidFill>
+              </a:rPr>
+              <a:t>Property</a:t>
+            </a:r>
+          </a:p>
+        </p:txBody>
+      </p:sp>
+      <p:sp>
+        <p:nvSpPr>
+          <p:cNvPr id="20" name="Rectangle 19"/>
+          <p:cNvSpPr/>
+          <p:nvPr/>
+        </p:nvSpPr>
+        <p:spPr>
+          <a:xfrm>
+            <a:off x="5316830" y="4243258"/>
+            <a:ext cx="1013923" cy="224109"/>
+          </a:xfrm>
+          <a:prstGeom prst="rect">
+            <a:avLst/>
+          </a:prstGeom>
+          <a:solidFill>
+            <a:srgbClr val="FFFFFF"/>
+          </a:solidFill>
+          <a:ln>
+            <a:solidFill>
+              <a:srgbClr val="1C3339"/>
+            </a:solidFill>
+          </a:ln>
+        </p:spPr>
+        <p:style>
+          <a:lnRef idx="1">
+            <a:schemeClr val="accent1"/>
+          </a:lnRef>
+          <a:fillRef idx="3">
+            <a:schemeClr val="accent1"/>
+          </a:fillRef>
+          <a:effectRef idx="2">
+            <a:schemeClr val="accent1"/>
+          </a:effectRef>
+          <a:fontRef idx="minor">
+            <a:schemeClr val="lt1"/>
+          </a:fontRef>
+        </p:style>
+        <p:txBody>
+          <a:bodyPr rtlCol="0" anchor="ctr"/>
+          <a:lstStyle/>
+          <a:p>
+            <a:pPr algn="ctr"/>
+            <a:r>
+              <a:rPr lang="en-US" sz="1600">
+                <a:solidFill>
+                  <a:schemeClr val="tx1"/>
+                </a:solidFill>
+              </a:rPr>
+              <a:t>Property</a:t>
+            </a:r>
+          </a:p>
+        </p:txBody>
+      </p:sp>
+      <p:sp>
+        <p:nvSpPr>
+          <p:cNvPr id="21" name="Rectangle 20"/>
+          <p:cNvSpPr/>
+          <p:nvPr/>
+        </p:nvSpPr>
+        <p:spPr>
+          <a:xfrm>
+            <a:off x="5316830" y="4463986"/>
+            <a:ext cx="1013923" cy="224109"/>
+          </a:xfrm>
+          <a:prstGeom prst="rect">
+            <a:avLst/>
+          </a:prstGeom>
+          <a:solidFill>
+            <a:srgbClr val="FFFFFF"/>
+          </a:solidFill>
+          <a:ln>
+            <a:solidFill>
+              <a:srgbClr val="1C3339"/>
+            </a:solidFill>
+          </a:ln>
+        </p:spPr>
+        <p:style>
+          <a:lnRef idx="1">
+            <a:schemeClr val="accent1"/>
+          </a:lnRef>
+          <a:fillRef idx="3">
+            <a:schemeClr val="accent1"/>
+          </a:fillRef>
+          <a:effectRef idx="2">
+            <a:schemeClr val="accent1"/>
+          </a:effectRef>
+          <a:fontRef idx="minor">
+            <a:schemeClr val="lt1"/>
+          </a:fontRef>
+        </p:style>
+        <p:txBody>
+          <a:bodyPr rtlCol="0" anchor="ctr"/>
+          <a:lstStyle/>
+          <a:p>
+            <a:pPr algn="ctr"/>
+            <a:r>
+              <a:rPr lang="en-US" sz="1600">
+                <a:solidFill>
+                  <a:schemeClr val="tx1"/>
+                </a:solidFill>
+              </a:rPr>
+              <a:t>Actions</a:t>
+            </a:r>
+          </a:p>
+        </p:txBody>
+      </p:sp>
+      <p:sp>
+        <p:nvSpPr>
+          <p:cNvPr id="22" name="Rectangle 21"/>
+          <p:cNvSpPr/>
+          <p:nvPr/>
+        </p:nvSpPr>
+        <p:spPr>
+          <a:xfrm>
+            <a:off x="5316830" y="4688095"/>
+            <a:ext cx="1013923" cy="224109"/>
+          </a:xfrm>
+          <a:prstGeom prst="rect">
+            <a:avLst/>
+          </a:prstGeom>
+          <a:solidFill>
+            <a:srgbClr val="FFFFFF"/>
+          </a:solidFill>
+          <a:ln>
+            <a:solidFill>
+              <a:srgbClr val="1C3339"/>
+            </a:solidFill>
+          </a:ln>
+        </p:spPr>
+        <p:style>
+          <a:lnRef idx="1">
+            <a:schemeClr val="accent1"/>
+          </a:lnRef>
+          <a:fillRef idx="3">
+            <a:schemeClr val="accent1"/>
+          </a:fillRef>
+          <a:effectRef idx="2">
+            <a:schemeClr val="accent1"/>
+          </a:effectRef>
+          <a:fontRef idx="minor">
+            <a:schemeClr val="lt1"/>
+          </a:fontRef>
+        </p:style>
+        <p:txBody>
+          <a:bodyPr rtlCol="0" anchor="ctr"/>
+          <a:lstStyle/>
+          <a:p>
+            <a:pPr algn="ctr"/>
+            <a:r>
+              <a:rPr lang="en-US" sz="1600">
+                <a:solidFill>
+                  <a:schemeClr val="tx1"/>
+                </a:solidFill>
+              </a:rPr>
+              <a:t>Event</a:t>
+            </a:r>
+          </a:p>
+        </p:txBody>
+      </p:sp>
+      <p:sp>
+        <p:nvSpPr>
+          <p:cNvPr id="23" name="Rectangle 22"/>
+          <p:cNvSpPr/>
+          <p:nvPr/>
+        </p:nvSpPr>
+        <p:spPr>
+          <a:xfrm>
+            <a:off x="7168098" y="3371301"/>
+            <a:ext cx="1013923" cy="224109"/>
+          </a:xfrm>
+          <a:prstGeom prst="rect">
+            <a:avLst/>
+          </a:prstGeom>
+          <a:solidFill>
+            <a:srgbClr val="FFFFFF"/>
+          </a:solidFill>
+          <a:ln>
+            <a:solidFill>
+              <a:srgbClr val="1C3339"/>
+            </a:solidFill>
+          </a:ln>
+        </p:spPr>
+        <p:style>
+          <a:lnRef idx="1">
+            <a:schemeClr val="accent1"/>
+          </a:lnRef>
+          <a:fillRef idx="3">
+            <a:schemeClr val="accent1"/>
+          </a:fillRef>
+          <a:effectRef idx="2">
+            <a:schemeClr val="accent1"/>
+          </a:effectRef>
+          <a:fontRef idx="minor">
+            <a:schemeClr val="lt1"/>
+          </a:fontRef>
+        </p:style>
+        <p:txBody>
+          <a:bodyPr rtlCol="0" anchor="ctr"/>
+          <a:lstStyle/>
+          <a:p>
+            <a:pPr algn="ctr"/>
+            <a:r>
+              <a:rPr lang="en-US" sz="1600">
+                <a:solidFill>
+                  <a:schemeClr val="tx1"/>
+                </a:solidFill>
+              </a:rPr>
+              <a:t>Property</a:t>
+            </a:r>
+          </a:p>
+        </p:txBody>
+      </p:sp>
+      <p:sp>
+        <p:nvSpPr>
+          <p:cNvPr id="24" name="Rectangle 23"/>
+          <p:cNvSpPr/>
+          <p:nvPr/>
+        </p:nvSpPr>
+        <p:spPr>
+          <a:xfrm>
+            <a:off x="7168098" y="3603740"/>
+            <a:ext cx="1013923" cy="224109"/>
+          </a:xfrm>
+          <a:prstGeom prst="rect">
+            <a:avLst/>
+          </a:prstGeom>
+          <a:solidFill>
+            <a:srgbClr val="FFFFFF"/>
+          </a:solidFill>
+          <a:ln>
+            <a:solidFill>
+              <a:srgbClr val="1C3339"/>
+            </a:solidFill>
+          </a:ln>
+        </p:spPr>
+        <p:style>
+          <a:lnRef idx="1">
+            <a:schemeClr val="accent1"/>
+          </a:lnRef>
+          <a:fillRef idx="3">
+            <a:schemeClr val="accent1"/>
+          </a:fillRef>
+          <a:effectRef idx="2">
+            <a:schemeClr val="accent1"/>
+          </a:effectRef>
+          <a:fontRef idx="minor">
+            <a:schemeClr val="lt1"/>
+          </a:fontRef>
+        </p:style>
+        <p:txBody>
+          <a:bodyPr rtlCol="0" anchor="ctr"/>
+          <a:lstStyle/>
+          <a:p>
+            <a:pPr algn="ctr"/>
+            <a:r>
+              <a:rPr lang="en-US" sz="1600">
+                <a:solidFill>
+                  <a:schemeClr val="tx1"/>
+                </a:solidFill>
+              </a:rPr>
+              <a:t>Property</a:t>
+            </a:r>
+          </a:p>
+        </p:txBody>
+      </p:sp>
+      <p:sp>
+        <p:nvSpPr>
+          <p:cNvPr id="25" name="Rectangle 24"/>
+          <p:cNvSpPr/>
+          <p:nvPr/>
+        </p:nvSpPr>
+        <p:spPr>
+          <a:xfrm>
+            <a:off x="7168098" y="3824468"/>
+            <a:ext cx="1013923" cy="224109"/>
+          </a:xfrm>
+          <a:prstGeom prst="rect">
+            <a:avLst/>
+          </a:prstGeom>
+          <a:solidFill>
+            <a:srgbClr val="FFFFFF"/>
+          </a:solidFill>
+          <a:ln>
+            <a:solidFill>
+              <a:srgbClr val="1C3339"/>
+            </a:solidFill>
+          </a:ln>
+        </p:spPr>
+        <p:style>
+          <a:lnRef idx="1">
+            <a:schemeClr val="accent1"/>
+          </a:lnRef>
+          <a:fillRef idx="3">
+            <a:schemeClr val="accent1"/>
+          </a:fillRef>
+          <a:effectRef idx="2">
+            <a:schemeClr val="accent1"/>
+          </a:effectRef>
+          <a:fontRef idx="minor">
+            <a:schemeClr val="lt1"/>
+          </a:fontRef>
+        </p:style>
+        <p:txBody>
+          <a:bodyPr rtlCol="0" anchor="ctr"/>
+          <a:lstStyle/>
+          <a:p>
+            <a:pPr algn="ctr"/>
+            <a:r>
+              <a:rPr lang="en-US" sz="1600">
+                <a:solidFill>
+                  <a:schemeClr val="tx1"/>
+                </a:solidFill>
+              </a:rPr>
+              <a:t>Actions</a:t>
+            </a:r>
+          </a:p>
+        </p:txBody>
+      </p:sp>
+      <p:sp>
+        <p:nvSpPr>
+          <p:cNvPr id="26" name="Rectangle 25"/>
+          <p:cNvSpPr/>
+          <p:nvPr/>
+        </p:nvSpPr>
+        <p:spPr>
+          <a:xfrm>
+            <a:off x="7168098" y="4048577"/>
+            <a:ext cx="1013923" cy="224109"/>
+          </a:xfrm>
+          <a:prstGeom prst="rect">
+            <a:avLst/>
+          </a:prstGeom>
+          <a:solidFill>
+            <a:srgbClr val="FFFFFF"/>
+          </a:solidFill>
+          <a:ln>
+            <a:solidFill>
+              <a:srgbClr val="1C3339"/>
+            </a:solidFill>
+          </a:ln>
+        </p:spPr>
+        <p:style>
+          <a:lnRef idx="1">
+            <a:schemeClr val="accent1"/>
+          </a:lnRef>
+          <a:fillRef idx="3">
+            <a:schemeClr val="accent1"/>
+          </a:fillRef>
+          <a:effectRef idx="2">
+            <a:schemeClr val="accent1"/>
+          </a:effectRef>
+          <a:fontRef idx="minor">
+            <a:schemeClr val="lt1"/>
+          </a:fontRef>
+        </p:style>
+        <p:txBody>
+          <a:bodyPr rtlCol="0" anchor="ctr"/>
+          <a:lstStyle/>
+          <a:p>
+            <a:pPr algn="ctr"/>
+            <a:r>
+              <a:rPr lang="en-US" sz="1600">
+                <a:solidFill>
+                  <a:schemeClr val="tx1"/>
+                </a:solidFill>
+              </a:rPr>
+              <a:t>Event</a:t>
+            </a:r>
+          </a:p>
+        </p:txBody>
+      </p:sp>
+      <p:sp>
+        <p:nvSpPr>
+          <p:cNvPr id="27" name="Left Brace 26"/>
+          <p:cNvSpPr/>
+          <p:nvPr/>
+        </p:nvSpPr>
+        <p:spPr>
+          <a:xfrm>
+            <a:off x="3500085" y="4031772"/>
+            <a:ext cx="117402" cy="896699"/>
+          </a:xfrm>
+          <a:prstGeom prst="leftBrace">
+            <a:avLst/>
+          </a:prstGeom>
+          <a:ln>
+            <a:solidFill>
+              <a:srgbClr val="1C3339"/>
+            </a:solidFill>
+          </a:ln>
+        </p:spPr>
+        <p:style>
+          <a:lnRef idx="2">
+            <a:schemeClr val="accent1"/>
+          </a:lnRef>
+          <a:fillRef idx="0">
+            <a:schemeClr val="accent1"/>
+          </a:fillRef>
+          <a:effectRef idx="1">
+            <a:schemeClr val="accent1"/>
+          </a:effectRef>
+          <a:fontRef idx="minor">
+            <a:schemeClr val="tx1"/>
+          </a:fontRef>
+        </p:style>
+        <p:txBody>
+          <a:bodyPr rtlCol="0" anchor="ctr"/>
+          <a:lstStyle/>
+          <a:p>
+            <a:pPr algn="ctr"/>
+            <a:endParaRPr lang="en-US"/>
+          </a:p>
+        </p:txBody>
+      </p:sp>
+      <p:sp>
+        <p:nvSpPr>
+          <p:cNvPr id="28" name="Left Brace 27"/>
+          <p:cNvSpPr/>
+          <p:nvPr/>
+        </p:nvSpPr>
+        <p:spPr>
+          <a:xfrm>
+            <a:off x="5102746" y="4019017"/>
+            <a:ext cx="117402" cy="896699"/>
+          </a:xfrm>
+          <a:prstGeom prst="leftBrace">
+            <a:avLst/>
+          </a:prstGeom>
+          <a:ln>
+            <a:solidFill>
+              <a:srgbClr val="1C3339"/>
+            </a:solidFill>
+          </a:ln>
+        </p:spPr>
+        <p:style>
+          <a:lnRef idx="2">
+            <a:schemeClr val="accent1"/>
+          </a:lnRef>
+          <a:fillRef idx="0">
+            <a:schemeClr val="accent1"/>
+          </a:fillRef>
+          <a:effectRef idx="1">
+            <a:schemeClr val="accent1"/>
+          </a:effectRef>
+          <a:fontRef idx="minor">
+            <a:schemeClr val="tx1"/>
+          </a:fontRef>
+        </p:style>
+        <p:txBody>
+          <a:bodyPr rtlCol="0" anchor="ctr"/>
+          <a:lstStyle/>
+          <a:p>
+            <a:pPr algn="ctr"/>
+            <a:endParaRPr lang="en-US"/>
+          </a:p>
+        </p:txBody>
+      </p:sp>
+      <p:cxnSp>
+        <p:nvCxnSpPr>
+          <p:cNvPr id="30" name="Straight Arrow Connector 29"/>
+          <p:cNvCxnSpPr>
+            <a:stCxn id="10" idx="3"/>
+            <a:endCxn id="27" idx="1"/>
+          </p:cNvCxnSpPr>
+          <p:nvPr/>
+        </p:nvCxnSpPr>
+        <p:spPr>
+          <a:xfrm>
+            <a:off x="3136888" y="4195999"/>
+            <a:ext cx="363197" cy="284123"/>
+          </a:xfrm>
+          <a:prstGeom prst="straightConnector1">
+            <a:avLst/>
+          </a:prstGeom>
+          <a:ln>
+            <a:solidFill>
+              <a:srgbClr val="1C3339"/>
+            </a:solidFill>
+            <a:tailEnd type="arrow"/>
+          </a:ln>
+        </p:spPr>
+        <p:style>
+          <a:lnRef idx="2">
+            <a:schemeClr val="accent1"/>
+          </a:lnRef>
+          <a:fillRef idx="0">
+            <a:schemeClr val="accent1"/>
+          </a:fillRef>
+          <a:effectRef idx="1">
+            <a:schemeClr val="accent1"/>
+          </a:effectRef>
+          <a:fontRef idx="minor">
+            <a:schemeClr val="tx1"/>
+          </a:fontRef>
+        </p:style>
+      </p:cxnSp>
+      <p:cxnSp>
+        <p:nvCxnSpPr>
+          <p:cNvPr id="31" name="Straight Arrow Connector 30"/>
+          <p:cNvCxnSpPr>
+            <a:stCxn id="14" idx="3"/>
+            <a:endCxn id="28" idx="1"/>
+          </p:cNvCxnSpPr>
+          <p:nvPr/>
+        </p:nvCxnSpPr>
+        <p:spPr>
+          <a:xfrm>
+            <a:off x="4760110" y="4367936"/>
+            <a:ext cx="342636" cy="99431"/>
+          </a:xfrm>
+          <a:prstGeom prst="straightConnector1">
+            <a:avLst/>
+          </a:prstGeom>
+          <a:ln>
+            <a:solidFill>
+              <a:srgbClr val="1C3339"/>
+            </a:solidFill>
+            <a:tailEnd type="arrow"/>
+          </a:ln>
+        </p:spPr>
+        <p:style>
+          <a:lnRef idx="2">
+            <a:schemeClr val="accent1"/>
+          </a:lnRef>
+          <a:fillRef idx="0">
+            <a:schemeClr val="accent1"/>
+          </a:fillRef>
+          <a:effectRef idx="1">
+            <a:schemeClr val="accent1"/>
+          </a:effectRef>
+          <a:fontRef idx="minor">
+            <a:schemeClr val="tx1"/>
+          </a:fontRef>
+        </p:style>
+      </p:cxnSp>
+      <p:cxnSp>
+        <p:nvCxnSpPr>
+          <p:cNvPr id="34" name="Straight Arrow Connector 33"/>
+          <p:cNvCxnSpPr>
+            <a:endCxn id="10" idx="1"/>
+          </p:cNvCxnSpPr>
+          <p:nvPr/>
+        </p:nvCxnSpPr>
+        <p:spPr>
+          <a:xfrm>
+            <a:off x="1547571" y="3488441"/>
+            <a:ext cx="575394" cy="707558"/>
+          </a:xfrm>
+          <a:prstGeom prst="straightConnector1">
+            <a:avLst/>
+          </a:prstGeom>
+          <a:ln>
+            <a:solidFill>
+              <a:srgbClr val="1C3339"/>
+            </a:solidFill>
+            <a:prstDash val="lgDash"/>
+            <a:tailEnd type="arrow"/>
+          </a:ln>
+        </p:spPr>
+        <p:style>
+          <a:lnRef idx="2">
+            <a:schemeClr val="accent1"/>
+          </a:lnRef>
+          <a:fillRef idx="0">
+            <a:schemeClr val="accent1"/>
+          </a:fillRef>
+          <a:effectRef idx="1">
+            <a:schemeClr val="accent1"/>
+          </a:effectRef>
+          <a:fontRef idx="minor">
+            <a:schemeClr val="tx1"/>
+          </a:fontRef>
+        </p:style>
+      </p:cxnSp>
+      <p:sp>
+        <p:nvSpPr>
+          <p:cNvPr id="43" name="Rectangle 42"/>
+          <p:cNvSpPr/>
+          <p:nvPr/>
+        </p:nvSpPr>
+        <p:spPr>
+          <a:xfrm>
+            <a:off x="7006960" y="2724416"/>
+            <a:ext cx="1371262" cy="646331"/>
+          </a:xfrm>
+          <a:prstGeom prst="rect">
+            <a:avLst/>
+          </a:prstGeom>
+        </p:spPr>
+        <p:txBody>
+          <a:bodyPr wrap="square">
+            <a:spAutoFit/>
+          </a:bodyPr>
+          <a:lstStyle/>
+          <a:p>
+            <a:pPr algn="ctr"/>
+            <a:r>
+              <a:rPr lang="en-US"/>
+              <a:t>WoT Thing Description</a:t>
+            </a:r>
+            <a:endParaRPr lang="en-US"/>
+          </a:p>
+        </p:txBody>
+      </p:sp>
+      <p:cxnSp>
+        <p:nvCxnSpPr>
+          <p:cNvPr id="45" name="Straight Arrow Connector 44"/>
+          <p:cNvCxnSpPr>
+            <a:stCxn id="23" idx="1"/>
+            <a:endCxn id="17" idx="3"/>
+          </p:cNvCxnSpPr>
+          <p:nvPr/>
+        </p:nvCxnSpPr>
+        <p:spPr>
+          <a:xfrm flipH="1">
+            <a:off x="6330753" y="3483356"/>
+            <a:ext cx="837345" cy="639518"/>
+          </a:xfrm>
+          <a:prstGeom prst="straightConnector1">
+            <a:avLst/>
+          </a:prstGeom>
+          <a:ln>
+            <a:solidFill>
+              <a:srgbClr val="1C3339"/>
+            </a:solidFill>
+            <a:prstDash val="lgDash"/>
+            <a:tailEnd type="arrow"/>
+          </a:ln>
+        </p:spPr>
+        <p:style>
+          <a:lnRef idx="2">
+            <a:schemeClr val="accent1"/>
+          </a:lnRef>
+          <a:fillRef idx="0">
+            <a:schemeClr val="accent1"/>
+          </a:fillRef>
+          <a:effectRef idx="1">
+            <a:schemeClr val="accent1"/>
+          </a:effectRef>
+          <a:fontRef idx="minor">
+            <a:schemeClr val="tx1"/>
+          </a:fontRef>
+        </p:style>
+      </p:cxnSp>
+      <p:cxnSp>
+        <p:nvCxnSpPr>
+          <p:cNvPr id="53" name="Straight Arrow Connector 52"/>
+          <p:cNvCxnSpPr>
+            <a:stCxn id="24" idx="1"/>
+            <a:endCxn id="20" idx="3"/>
+          </p:cNvCxnSpPr>
+          <p:nvPr/>
+        </p:nvCxnSpPr>
+        <p:spPr>
+          <a:xfrm flipH="1">
+            <a:off x="6330753" y="3715795"/>
+            <a:ext cx="837345" cy="639518"/>
+          </a:xfrm>
+          <a:prstGeom prst="straightConnector1">
+            <a:avLst/>
+          </a:prstGeom>
+          <a:ln>
+            <a:solidFill>
+              <a:srgbClr val="1C3339"/>
+            </a:solidFill>
+            <a:prstDash val="lgDash"/>
+            <a:tailEnd type="arrow"/>
+          </a:ln>
+        </p:spPr>
+        <p:style>
+          <a:lnRef idx="2">
+            <a:schemeClr val="accent1"/>
+          </a:lnRef>
+          <a:fillRef idx="0">
+            <a:schemeClr val="accent1"/>
+          </a:fillRef>
+          <a:effectRef idx="1">
+            <a:schemeClr val="accent1"/>
+          </a:effectRef>
+          <a:fontRef idx="minor">
+            <a:schemeClr val="tx1"/>
+          </a:fontRef>
+        </p:style>
+      </p:cxnSp>
+      <p:cxnSp>
+        <p:nvCxnSpPr>
+          <p:cNvPr id="54" name="Straight Arrow Connector 53"/>
+          <p:cNvCxnSpPr>
+            <a:stCxn id="25" idx="1"/>
+            <a:endCxn id="21" idx="3"/>
+          </p:cNvCxnSpPr>
+          <p:nvPr/>
+        </p:nvCxnSpPr>
+        <p:spPr>
+          <a:xfrm flipH="1">
+            <a:off x="6330753" y="3936523"/>
+            <a:ext cx="837345" cy="639518"/>
+          </a:xfrm>
+          <a:prstGeom prst="straightConnector1">
+            <a:avLst/>
+          </a:prstGeom>
+          <a:ln>
+            <a:solidFill>
+              <a:srgbClr val="1C3339"/>
+            </a:solidFill>
+            <a:prstDash val="lgDash"/>
+            <a:tailEnd type="arrow"/>
+          </a:ln>
+        </p:spPr>
+        <p:style>
+          <a:lnRef idx="2">
+            <a:schemeClr val="accent1"/>
+          </a:lnRef>
+          <a:fillRef idx="0">
+            <a:schemeClr val="accent1"/>
+          </a:fillRef>
+          <a:effectRef idx="1">
+            <a:schemeClr val="accent1"/>
+          </a:effectRef>
+          <a:fontRef idx="minor">
+            <a:schemeClr val="tx1"/>
+          </a:fontRef>
+        </p:style>
+      </p:cxnSp>
+      <p:cxnSp>
+        <p:nvCxnSpPr>
+          <p:cNvPr id="55" name="Straight Arrow Connector 54"/>
+          <p:cNvCxnSpPr>
+            <a:stCxn id="26" idx="1"/>
+            <a:endCxn id="22" idx="3"/>
+          </p:cNvCxnSpPr>
+          <p:nvPr/>
+        </p:nvCxnSpPr>
+        <p:spPr>
+          <a:xfrm flipH="1">
+            <a:off x="6330753" y="4160632"/>
+            <a:ext cx="837345" cy="639518"/>
+          </a:xfrm>
+          <a:prstGeom prst="straightConnector1">
+            <a:avLst/>
+          </a:prstGeom>
+          <a:ln>
+            <a:solidFill>
+              <a:srgbClr val="1C3339"/>
+            </a:solidFill>
+            <a:prstDash val="lgDash"/>
+            <a:tailEnd type="arrow"/>
+          </a:ln>
+        </p:spPr>
+        <p:style>
+          <a:lnRef idx="2">
+            <a:schemeClr val="accent1"/>
+          </a:lnRef>
+          <a:fillRef idx="0">
+            <a:schemeClr val="accent1"/>
+          </a:fillRef>
+          <a:effectRef idx="1">
+            <a:schemeClr val="accent1"/>
+          </a:effectRef>
+          <a:fontRef idx="minor">
+            <a:schemeClr val="tx1"/>
+          </a:fontRef>
+        </p:style>
+      </p:cxnSp>
+      <p:sp>
+        <p:nvSpPr>
+          <p:cNvPr id="77" name="Rectangle 76"/>
+          <p:cNvSpPr/>
+          <p:nvPr/>
+        </p:nvSpPr>
+        <p:spPr>
+          <a:xfrm>
+            <a:off x="2122965" y="3488441"/>
+            <a:ext cx="1010050" cy="369332"/>
+          </a:xfrm>
+          <a:prstGeom prst="rect">
+            <a:avLst/>
+          </a:prstGeom>
+        </p:spPr>
+        <p:txBody>
+          <a:bodyPr wrap="none">
+            <a:spAutoFit/>
+          </a:bodyPr>
+          <a:lstStyle/>
+          <a:p>
+            <a:r>
+              <a:rPr lang="en-US"/>
+              <a:t>/oic/res/</a:t>
+            </a:r>
+            <a:endParaRPr lang="en-US"/>
+          </a:p>
+        </p:txBody>
+      </p:sp>
+      <p:sp>
+        <p:nvSpPr>
+          <p:cNvPr id="78" name="Rectangle 77"/>
+          <p:cNvSpPr/>
+          <p:nvPr/>
+        </p:nvSpPr>
+        <p:spPr>
+          <a:xfrm>
+            <a:off x="3692822" y="3392393"/>
+            <a:ext cx="1119492" cy="646331"/>
+          </a:xfrm>
+          <a:prstGeom prst="rect">
+            <a:avLst/>
+          </a:prstGeom>
+        </p:spPr>
+        <p:txBody>
+          <a:bodyPr wrap="none">
+            <a:spAutoFit/>
+          </a:bodyPr>
+          <a:lstStyle/>
+          <a:p>
+            <a:pPr algn="ctr"/>
+            <a:r>
+              <a:rPr lang="en-US"/>
+              <a:t>Device</a:t>
+            </a:r>
+          </a:p>
+          <a:p>
+            <a:pPr algn="ctr"/>
+            <a:r>
+              <a:rPr lang="en-US"/>
+              <a:t>Collection</a:t>
+            </a:r>
+            <a:endParaRPr lang="en-US"/>
+          </a:p>
+        </p:txBody>
+      </p:sp>
+      <p:sp>
+        <p:nvSpPr>
+          <p:cNvPr id="79" name="Rectangle 78"/>
+          <p:cNvSpPr/>
+          <p:nvPr/>
+        </p:nvSpPr>
+        <p:spPr>
+          <a:xfrm>
+            <a:off x="5220148" y="3348270"/>
+            <a:ext cx="1194262" cy="646331"/>
+          </a:xfrm>
+          <a:prstGeom prst="rect">
+            <a:avLst/>
+          </a:prstGeom>
+        </p:spPr>
+        <p:txBody>
+          <a:bodyPr wrap="square">
+            <a:spAutoFit/>
+          </a:bodyPr>
+          <a:lstStyle/>
+          <a:p>
+            <a:pPr algn="ctr"/>
+            <a:r>
+              <a:rPr lang="en-US"/>
+              <a:t>Capability</a:t>
+            </a:r>
+          </a:p>
+          <a:p>
+            <a:pPr algn="ctr"/>
+            <a:r>
+              <a:rPr lang="en-US"/>
+              <a:t>Collection</a:t>
+            </a:r>
+          </a:p>
+        </p:txBody>
+      </p:sp>
+      <p:sp>
+        <p:nvSpPr>
+          <p:cNvPr id="81" name="Rectangle 80"/>
+          <p:cNvSpPr/>
+          <p:nvPr/>
+        </p:nvSpPr>
+        <p:spPr>
+          <a:xfrm>
+            <a:off x="1942466" y="3312603"/>
+            <a:ext cx="4664055" cy="1799217"/>
+          </a:xfrm>
+          <a:prstGeom prst="rect">
+            <a:avLst/>
+          </a:prstGeom>
+          <a:noFill/>
+          <a:ln>
+            <a:solidFill>
+              <a:srgbClr val="1C3339"/>
+            </a:solidFill>
+            <a:prstDash val="lgDash"/>
+          </a:ln>
+        </p:spPr>
+        <p:style>
+          <a:lnRef idx="1">
+            <a:schemeClr val="accent1"/>
+          </a:lnRef>
+          <a:fillRef idx="3">
+            <a:schemeClr val="accent1"/>
+          </a:fillRef>
+          <a:effectRef idx="2">
+            <a:schemeClr val="accent1"/>
+          </a:effectRef>
+          <a:fontRef idx="minor">
+            <a:schemeClr val="lt1"/>
+          </a:fontRef>
+        </p:style>
+        <p:txBody>
+          <a:bodyPr rtlCol="0" anchor="ctr"/>
+          <a:lstStyle/>
+          <a:p>
+            <a:pPr algn="ctr"/>
+            <a:endParaRPr lang="en-US" sz="1600">
+              <a:solidFill>
+                <a:schemeClr val="tx1"/>
+              </a:solidFill>
+            </a:endParaRPr>
+          </a:p>
+        </p:txBody>
+      </p:sp>
+      <p:sp>
+        <p:nvSpPr>
+          <p:cNvPr id="83" name="Rectangle 82"/>
+          <p:cNvSpPr/>
+          <p:nvPr/>
+        </p:nvSpPr>
+        <p:spPr>
+          <a:xfrm>
+            <a:off x="3891062" y="2914906"/>
+            <a:ext cx="869048" cy="369332"/>
+          </a:xfrm>
+          <a:prstGeom prst="rect">
+            <a:avLst/>
+          </a:prstGeom>
+        </p:spPr>
+        <p:txBody>
+          <a:bodyPr wrap="none">
+            <a:spAutoFit/>
+          </a:bodyPr>
+          <a:lstStyle/>
+          <a:p>
+            <a:r>
+              <a:rPr lang="en-US"/>
+              <a:t>IoTivity</a:t>
+            </a:r>
+            <a:endParaRPr lang="en-US"/>
+          </a:p>
+        </p:txBody>
+      </p:sp>
+    </p:spTree>
+    <p:extLst>
+      <p:ext uri="{BB962C8B-B14F-4D97-AF65-F5344CB8AC3E}">
+        <p14:creationId xmlns:p14="http://schemas.microsoft.com/office/powerpoint/2010/main" val="1756715496"/>
+      </p:ext>
+    </p:extLst>
+  </p:cSld>
+  <p:clrMapOvr>
+    <a:masterClrMapping/>
+  </p:clrMapOvr>
+</p:sld>
+</file>
+
 <file path=ppt/slides/slide2.xml><?xml version="1.0" encoding="utf-8"?>
 <p:sld xmlns:a="http://schemas.openxmlformats.org/drawingml/2006/main" xmlns:r="http://schemas.openxmlformats.org/officeDocument/2006/relationships" xmlns:p="http://schemas.openxmlformats.org/presentationml/2006/main">
   <p:cSld>
@@ -5388,7 +7105,11 @@
           <a:p>
             <a:r>
               <a:rPr lang="en-US"/>
-              <a:t>How does oneiota help? Make a W3C WoT Interaction model in RAML, customize the json-schema payloads for Capability types</a:t>
+              <a:t>Map the</a:t>
+            </a:r>
+            <a:r>
+              <a:rPr lang="en-US"/>
+              <a:t> W3C WoT Interaction model in RAML, customize the json-schema payloads for Capability types</a:t>
             </a:r>
           </a:p>
         </p:txBody>
@@ -5458,7 +7179,7 @@
         <p:spPr/>
         <p:txBody>
           <a:bodyPr>
-            <a:normAutofit fontScale="92500"/>
+            <a:normAutofit/>
           </a:bodyPr>
           <a:lstStyle/>
           <a:p>
@@ -5470,21 +7191,18 @@
           <a:p>
             <a:r>
               <a:rPr lang="en-US"/>
-              <a:t>It should be fairly easy to create the capability types by customizing payloads using json-schema</a:t>
-            </a:r>
-          </a:p>
-          <a:p>
-            <a:r>
-              <a:rPr lang="en-US"/>
-              <a:t>Use WoT Thing Descriptions and RAML Capability Models to construct instances?</a:t>
-            </a:r>
-          </a:p>
-          <a:p>
-            <a:r>
-              <a:rPr lang="en-US"/>
-              <a:t>Where are the payloads differentiated? RAML (rt), TD, or somewhere else? </a:t>
-            </a:r>
-            <a:endParaRPr lang="en-US"/>
+              <a:t>C</a:t>
+            </a:r>
+            <a:r>
+              <a:rPr lang="en-US"/>
+              <a:t>reate application capability types by customizing payloads using json-schema and derived models</a:t>
+            </a:r>
+          </a:p>
+          <a:p>
+            <a:r>
+              <a:rPr lang="en-US"/>
+              <a:t>Use WoT Thing Descriptions and RAML Capability Models to construct instances</a:t>
+            </a:r>
           </a:p>
           <a:p>
             <a:endParaRPr lang="en-US"/>

</xml_diff>